<commit_message>
final da apresentacao de cem
</commit_message>
<xml_diff>
--- a/cem_20308/docs/cispr22.pptx
+++ b/cem_20308/docs/cispr22.pptx
@@ -5,10 +5,10 @@
     <p:sldMasterId id="2147483648" r:id="rId2"/>
   </p:sldMasterIdLst>
   <p:notesMasterIdLst>
-    <p:notesMasterId r:id="rId18"/>
+    <p:notesMasterId r:id="rId19"/>
   </p:notesMasterIdLst>
   <p:handoutMasterIdLst>
-    <p:handoutMasterId r:id="rId19"/>
+    <p:handoutMasterId r:id="rId20"/>
   </p:handoutMasterIdLst>
   <p:sldIdLst>
     <p:sldId id="256" r:id="rId3"/>
@@ -21,11 +21,12 @@
     <p:sldId id="262" r:id="rId10"/>
     <p:sldId id="263" r:id="rId11"/>
     <p:sldId id="267" r:id="rId12"/>
-    <p:sldId id="271" r:id="rId13"/>
-    <p:sldId id="268" r:id="rId14"/>
+    <p:sldId id="268" r:id="rId13"/>
+    <p:sldId id="271" r:id="rId14"/>
     <p:sldId id="270" r:id="rId15"/>
-    <p:sldId id="266" r:id="rId16"/>
-    <p:sldId id="265" r:id="rId17"/>
+    <p:sldId id="272" r:id="rId16"/>
+    <p:sldId id="266" r:id="rId17"/>
+    <p:sldId id="265" r:id="rId18"/>
   </p:sldIdLst>
   <p:sldSz cx="9144000" cy="6858000" type="screen4x3"/>
   <p:notesSz cx="6858000" cy="9144000"/>
@@ -205,7 +206,7 @@
             <a:fld id="{A849C5AD-4428-4E9C-9C84-11B72C9365FB}" type="datetimeFigureOut">
               <a:rPr lang="pt-BR" smtClean="0"/>
               <a:pPr/>
-              <a:t>21/11/2010</a:t>
+              <a:t>22/11/2010</a:t>
             </a:fld>
             <a:endParaRPr lang="pt-BR" smtClean="0"/>
           </a:p>
@@ -273,7 +274,7 @@
     </p:spTree>
     <p:extLst>
       <p:ext uri="{BB962C8B-B14F-4D97-AF65-F5344CB8AC3E}">
-        <p14:creationId xmlns:p14="http://schemas.microsoft.com/office/powerpoint/2010/main" val="106172645"/>
+        <p14:creationId xmlns:p14="http://schemas.microsoft.com/office/powerpoint/2010/main" xmlns="" val="106172645"/>
       </p:ext>
     </p:extLst>
   </p:cSld>
@@ -519,7 +520,7 @@
     </p:spTree>
     <p:extLst>
       <p:ext uri="{BB962C8B-B14F-4D97-AF65-F5344CB8AC3E}">
-        <p14:creationId xmlns:p14="http://schemas.microsoft.com/office/powerpoint/2010/main" val="2669197626"/>
+        <p14:creationId xmlns:p14="http://schemas.microsoft.com/office/powerpoint/2010/main" xmlns="" val="2669197626"/>
       </p:ext>
     </p:extLst>
   </p:cSld>
@@ -1180,6 +1181,88 @@
               <a:rPr lang="pt-BR" smtClean="0"/>
               <a:pPr/>
               <a:t>15</a:t>
+            </a:fld>
+            <a:endParaRPr lang="pt-BR"/>
+          </a:p>
+        </p:txBody>
+      </p:sp>
+    </p:spTree>
+  </p:cSld>
+  <p:clrMapOvr>
+    <a:masterClrMapping/>
+  </p:clrMapOvr>
+</p:notes>
+</file>
+
+<file path=ppt/notesSlides/notesSlide8.xml><?xml version="1.0" encoding="utf-8"?>
+<p:notes xmlns:a="http://schemas.openxmlformats.org/drawingml/2006/main" xmlns:r="http://schemas.openxmlformats.org/officeDocument/2006/relationships" xmlns:p="http://schemas.openxmlformats.org/presentationml/2006/main">
+  <p:cSld>
+    <p:spTree>
+      <p:nvGrpSpPr>
+        <p:cNvPr id="1" name=""/>
+        <p:cNvGrpSpPr/>
+        <p:nvPr/>
+      </p:nvGrpSpPr>
+      <p:grpSpPr>
+        <a:xfrm>
+          <a:off x="0" y="0"/>
+          <a:ext cx="0" cy="0"/>
+          <a:chOff x="0" y="0"/>
+          <a:chExt cx="0" cy="0"/>
+        </a:xfrm>
+      </p:grpSpPr>
+      <p:sp>
+        <p:nvSpPr>
+          <p:cNvPr id="2" name="Espaço Reservado para Imagem de Slide 1"/>
+          <p:cNvSpPr>
+            <a:spLocks noGrp="1" noRot="1" noChangeAspect="1"/>
+          </p:cNvSpPr>
+          <p:nvPr>
+            <p:ph type="sldImg"/>
+          </p:nvPr>
+        </p:nvSpPr>
+        <p:spPr/>
+      </p:sp>
+      <p:sp>
+        <p:nvSpPr>
+          <p:cNvPr id="3" name="Espaço Reservado para Anotações 2"/>
+          <p:cNvSpPr>
+            <a:spLocks noGrp="1"/>
+          </p:cNvSpPr>
+          <p:nvPr>
+            <p:ph type="body" idx="1"/>
+          </p:nvPr>
+        </p:nvSpPr>
+        <p:spPr/>
+        <p:txBody>
+          <a:bodyPr>
+            <a:normAutofit/>
+          </a:bodyPr>
+          <a:lstStyle/>
+          <a:p>
+            <a:endParaRPr lang="pt-BR" dirty="0"/>
+          </a:p>
+        </p:txBody>
+      </p:sp>
+      <p:sp>
+        <p:nvSpPr>
+          <p:cNvPr id="4" name="Espaço Reservado para Número de Slide 3"/>
+          <p:cNvSpPr>
+            <a:spLocks noGrp="1"/>
+          </p:cNvSpPr>
+          <p:nvPr>
+            <p:ph type="sldNum" sz="quarter" idx="10"/>
+          </p:nvPr>
+        </p:nvSpPr>
+        <p:spPr/>
+        <p:txBody>
+          <a:bodyPr/>
+          <a:lstStyle/>
+          <a:p>
+            <a:fld id="{CA077768-21C8-4125-A345-258E48D2EED0}" type="slidenum">
+              <a:rPr lang="pt-BR" smtClean="0"/>
+              <a:pPr/>
+              <a:t>16</a:t>
             </a:fld>
             <a:endParaRPr lang="pt-BR"/>
           </a:p>
@@ -3189,14 +3272,7 @@
                 <a:latin typeface="Arial" pitchFamily="34" charset="0"/>
                 <a:cs typeface="Arial" pitchFamily="34" charset="0"/>
               </a:rPr>
-              <a:t>Arranjos gerais</a:t>
-            </a:r>
-            <a:r>
-              <a:rPr dirty="0" smtClean="0">
-                <a:latin typeface="Arial" pitchFamily="34" charset="0"/>
-                <a:cs typeface="Arial" pitchFamily="34" charset="0"/>
-              </a:rPr>
-              <a:t>.</a:t>
+              <a:t>Arranjos gerais.</a:t>
             </a:r>
           </a:p>
           <a:p>
@@ -3377,7 +3453,7 @@
         <p:spPr/>
         <p:txBody>
           <a:bodyPr>
-            <a:normAutofit/>
+            <a:normAutofit fontScale="77500" lnSpcReduction="20000"/>
           </a:bodyPr>
           <a:lstStyle/>
           <a:p>
@@ -3387,12 +3463,44 @@
               </a:lnSpc>
             </a:pPr>
             <a:r>
-              <a:rPr lang="pt-BR" dirty="0">
+              <a:rPr smtClean="0">
                 <a:latin typeface="Arial" pitchFamily="34" charset="0"/>
                 <a:cs typeface="Arial" pitchFamily="34" charset="0"/>
               </a:rPr>
-              <a:t>Arranjo dos equipamentos em teste.</a:t>
-            </a:r>
+              <a:t>Detecção de medidas:</a:t>
+            </a:r>
+          </a:p>
+          <a:p>
+            <a:pPr lvl="1">
+              <a:lnSpc>
+                <a:spcPct val="150000"/>
+              </a:lnSpc>
+            </a:pPr>
+            <a:r>
+              <a:rPr smtClean="0">
+                <a:latin typeface="Arial" pitchFamily="34" charset="0"/>
+                <a:cs typeface="Arial" pitchFamily="34" charset="0"/>
+              </a:rPr>
+              <a:t>Deve ser realizado usando um receptor de detecção de quase-pico e média.</a:t>
+            </a:r>
+          </a:p>
+          <a:p>
+            <a:pPr lvl="1">
+              <a:lnSpc>
+                <a:spcPct val="150000"/>
+              </a:lnSpc>
+            </a:pPr>
+            <a:r>
+              <a:rPr smtClean="0">
+                <a:latin typeface="Arial" pitchFamily="34" charset="0"/>
+                <a:cs typeface="Arial" pitchFamily="34" charset="0"/>
+              </a:rPr>
+              <a:t>A largura de banda do receptor de 6dB.</a:t>
+            </a:r>
+            <a:endParaRPr smtClean="0">
+              <a:latin typeface="Arial" pitchFamily="34" charset="0"/>
+              <a:cs typeface="Arial" pitchFamily="34" charset="0"/>
+            </a:endParaRPr>
           </a:p>
           <a:p>
             <a:pPr>
@@ -3401,19 +3509,97 @@
               </a:lnSpc>
             </a:pPr>
             <a:r>
-              <a:rPr lang="pt-BR">
+              <a:rPr smtClean="0">
                 <a:latin typeface="Arial" pitchFamily="34" charset="0"/>
                 <a:cs typeface="Arial" pitchFamily="34" charset="0"/>
               </a:rPr>
-              <a:t>Operação dos equipamentos em teste.</a:t>
-            </a:r>
-          </a:p>
-          <a:p>
-            <a:pPr marL="0" indent="0">
+              <a:t>Redes </a:t>
+            </a:r>
+            <a:r>
+              <a:rPr smtClean="0">
+                <a:latin typeface="Arial" pitchFamily="34" charset="0"/>
+                <a:cs typeface="Arial" pitchFamily="34" charset="0"/>
+              </a:rPr>
+              <a:t>de alimentação artificiais </a:t>
+            </a:r>
+            <a:r>
+              <a:rPr i="1" smtClean="0">
+                <a:latin typeface="Arial" pitchFamily="34" charset="0"/>
+                <a:cs typeface="Arial" pitchFamily="34" charset="0"/>
+              </a:rPr>
+              <a:t>(Artificial Mains Network - AMN</a:t>
+            </a:r>
+            <a:r>
+              <a:rPr i="1" smtClean="0">
+                <a:latin typeface="Arial" pitchFamily="34" charset="0"/>
+                <a:cs typeface="Arial" pitchFamily="34" charset="0"/>
+              </a:rPr>
+              <a:t>).</a:t>
+            </a:r>
+          </a:p>
+          <a:p>
+            <a:pPr lvl="1">
+              <a:lnSpc>
+                <a:spcPct val="150000"/>
+              </a:lnSpc>
+            </a:pPr>
+            <a:r>
+              <a:rPr smtClean="0">
+                <a:latin typeface="Arial" pitchFamily="34" charset="0"/>
+                <a:cs typeface="Arial" pitchFamily="34" charset="0"/>
+              </a:rPr>
+              <a:t>É necessário para fornecer  uma impedância definida à altas frequencias.</a:t>
+            </a:r>
+          </a:p>
+          <a:p>
+            <a:pPr lvl="1">
+              <a:lnSpc>
+                <a:spcPct val="150000"/>
+              </a:lnSpc>
+            </a:pPr>
+            <a:r>
+              <a:rPr smtClean="0">
+                <a:latin typeface="Arial" pitchFamily="34" charset="0"/>
+                <a:cs typeface="Arial" pitchFamily="34" charset="0"/>
+              </a:rPr>
+              <a:t>Fornecer isolação ao circuito em teste.</a:t>
+            </a:r>
+          </a:p>
+          <a:p>
+            <a:pPr lvl="1">
+              <a:lnSpc>
+                <a:spcPct val="150000"/>
+              </a:lnSpc>
+            </a:pPr>
+            <a:r>
+              <a:rPr smtClean="0">
+                <a:latin typeface="Arial" pitchFamily="34" charset="0"/>
+                <a:cs typeface="Arial" pitchFamily="34" charset="0"/>
+              </a:rPr>
+              <a:t>A perturbação conduzida deve ser medida entre a Fase e o Plano de Terra e o Neutro e o plano de Terra.</a:t>
+            </a:r>
+            <a:endParaRPr smtClean="0">
+              <a:latin typeface="Arial" pitchFamily="34" charset="0"/>
+              <a:cs typeface="Arial" pitchFamily="34" charset="0"/>
+            </a:endParaRPr>
+          </a:p>
+          <a:p>
+            <a:pPr>
               <a:lnSpc>
                 <a:spcPct val="150000"/>
               </a:lnSpc>
               <a:buNone/>
+            </a:pPr>
+            <a:endParaRPr smtClean="0">
+              <a:latin typeface="Arial" pitchFamily="34" charset="0"/>
+              <a:cs typeface="Arial" pitchFamily="34" charset="0"/>
+            </a:endParaRPr>
+          </a:p>
+          <a:p>
+            <a:pPr>
+              <a:lnSpc>
+                <a:spcPct val="150000"/>
+              </a:lnSpc>
             </a:pPr>
             <a:endParaRPr lang="pt-BR" dirty="0" smtClean="0">
               <a:latin typeface="Arial" pitchFamily="34" charset="0"/>
@@ -3435,7 +3621,7 @@
         <p:spPr/>
         <p:txBody>
           <a:bodyPr>
-            <a:normAutofit/>
+            <a:normAutofit fontScale="90000"/>
           </a:bodyPr>
           <a:lstStyle/>
           <a:p>
@@ -3444,7 +3630,7 @@
                 <a:latin typeface="Arial" pitchFamily="34" charset="0"/>
                 <a:cs typeface="Arial" pitchFamily="34" charset="0"/>
               </a:rPr>
-              <a:t>CONDIÇÃO GERAL DE MEDIÇÃO</a:t>
+              <a:t>MÉTODO DE MEDIDA DA PERTURBAÇÃO CONDUZIDA</a:t>
             </a:r>
             <a:endParaRPr lang="pt-BR" dirty="0">
               <a:latin typeface="Arial" pitchFamily="34" charset="0"/>
@@ -3454,11 +3640,6 @@
         </p:txBody>
       </p:sp>
     </p:spTree>
-    <p:extLst>
-      <p:ext uri="{BB962C8B-B14F-4D97-AF65-F5344CB8AC3E}">
-        <p14:creationId xmlns:p14="http://schemas.microsoft.com/office/powerpoint/2010/main" val="2271265954"/>
-      </p:ext>
-    </p:extLst>
   </p:cSld>
   <p:clrMapOvr>
     <a:masterClrMapping/>
@@ -3503,7 +3684,7 @@
         <p:spPr/>
         <p:txBody>
           <a:bodyPr>
-            <a:normAutofit fontScale="92500"/>
+            <a:normAutofit lnSpcReduction="10000"/>
           </a:bodyPr>
           <a:lstStyle/>
           <a:p>
@@ -3517,8 +3698,44 @@
                 <a:latin typeface="Arial" pitchFamily="34" charset="0"/>
                 <a:cs typeface="Arial" pitchFamily="34" charset="0"/>
               </a:rPr>
-              <a:t>Detectores de medições.</a:t>
-            </a:r>
+              <a:t>Plano de referência de terra.</a:t>
+            </a:r>
+            <a:endParaRPr i="1" smtClean="0">
+              <a:latin typeface="Arial" pitchFamily="34" charset="0"/>
+              <a:cs typeface="Arial" pitchFamily="34" charset="0"/>
+            </a:endParaRPr>
+          </a:p>
+          <a:p>
+            <a:pPr lvl="1">
+              <a:lnSpc>
+                <a:spcPct val="150000"/>
+              </a:lnSpc>
+            </a:pPr>
+            <a:r>
+              <a:rPr smtClean="0">
+                <a:latin typeface="Arial" pitchFamily="34" charset="0"/>
+                <a:cs typeface="Arial" pitchFamily="34" charset="0"/>
+              </a:rPr>
+              <a:t>Um plano horizontal ou vertical deve estender-se pelo menos 0,5m da projeção do arranjo de teste.</a:t>
+            </a:r>
+          </a:p>
+          <a:p>
+            <a:pPr lvl="1">
+              <a:lnSpc>
+                <a:spcPct val="150000"/>
+              </a:lnSpc>
+            </a:pPr>
+            <a:r>
+              <a:rPr smtClean="0">
+                <a:latin typeface="Arial" pitchFamily="34" charset="0"/>
+                <a:cs typeface="Arial" pitchFamily="34" charset="0"/>
+              </a:rPr>
+              <a:t>Dimensões mínimas de 2m x 2m</a:t>
+            </a:r>
+            <a:endParaRPr smtClean="0">
+              <a:latin typeface="Arial" pitchFamily="34" charset="0"/>
+              <a:cs typeface="Arial" pitchFamily="34" charset="0"/>
+            </a:endParaRPr>
           </a:p>
           <a:p>
             <a:pPr>
@@ -3531,11 +3748,29 @@
                 <a:latin typeface="Arial" pitchFamily="34" charset="0"/>
                 <a:cs typeface="Arial" pitchFamily="34" charset="0"/>
               </a:rPr>
-              <a:t>Receptores de medições.</a:t>
-            </a:r>
-          </a:p>
-          <a:p>
-            <a:pPr>
+              <a:t>Exemplo de arranjo </a:t>
+            </a:r>
+            <a:r>
+              <a:rPr smtClean="0">
+                <a:latin typeface="Arial" pitchFamily="34" charset="0"/>
+                <a:cs typeface="Arial" pitchFamily="34" charset="0"/>
+              </a:rPr>
+              <a:t>dos equipamentos em teste</a:t>
+            </a:r>
+            <a:r>
+              <a:rPr smtClean="0">
+                <a:latin typeface="Arial" pitchFamily="34" charset="0"/>
+                <a:cs typeface="Arial" pitchFamily="34" charset="0"/>
+              </a:rPr>
+              <a:t>.</a:t>
+            </a:r>
+            <a:endParaRPr smtClean="0">
+              <a:latin typeface="Arial" pitchFamily="34" charset="0"/>
+              <a:cs typeface="Arial" pitchFamily="34" charset="0"/>
+            </a:endParaRPr>
+          </a:p>
+          <a:p>
+            <a:pPr lvl="1">
               <a:lnSpc>
                 <a:spcPct val="150000"/>
               </a:lnSpc>
@@ -3545,18 +3780,11 @@
                 <a:latin typeface="Arial" pitchFamily="34" charset="0"/>
                 <a:cs typeface="Arial" pitchFamily="34" charset="0"/>
               </a:rPr>
-              <a:t>Redes artificiais </a:t>
-            </a:r>
-            <a:r>
-              <a:rPr i="1" smtClean="0">
-                <a:latin typeface="Arial" pitchFamily="34" charset="0"/>
-                <a:cs typeface="Arial" pitchFamily="34" charset="0"/>
-              </a:rPr>
-              <a:t>(Artificial Mains Network - AMN).</a:t>
-            </a:r>
-          </a:p>
-          <a:p>
-            <a:pPr>
+              <a:t>Executar com um plano de referencia horizontal.</a:t>
+            </a:r>
+          </a:p>
+          <a:p>
+            <a:pPr lvl="1">
               <a:lnSpc>
                 <a:spcPct val="150000"/>
               </a:lnSpc>
@@ -3566,69 +3794,22 @@
                 <a:latin typeface="Arial" pitchFamily="34" charset="0"/>
                 <a:cs typeface="Arial" pitchFamily="34" charset="0"/>
               </a:rPr>
-              <a:t>Plano de terra.</a:t>
-            </a:r>
-          </a:p>
-          <a:p>
-            <a:pPr>
-              <a:lnSpc>
-                <a:spcPct val="150000"/>
-              </a:lnSpc>
-            </a:pPr>
+              <a:t>O equipamento em teste deve ser colocado em uma mesa n</a:t>
+            </a:r>
+            <a:r>
+              <a:rPr lang="pt-BR" dirty="0" smtClean="0">
+                <a:latin typeface="Arial" pitchFamily="34" charset="0"/>
+                <a:cs typeface="Arial" pitchFamily="34" charset="0"/>
+              </a:rPr>
+              <a:t>ã</a:t>
+            </a:r>
             <a:r>
               <a:rPr smtClean="0">
                 <a:latin typeface="Arial" pitchFamily="34" charset="0"/>
                 <a:cs typeface="Arial" pitchFamily="34" charset="0"/>
               </a:rPr>
-              <a:t>Arranjo dos equipamentos em teste.</a:t>
-            </a:r>
-          </a:p>
-          <a:p>
-            <a:pPr>
-              <a:lnSpc>
-                <a:spcPct val="150000"/>
-              </a:lnSpc>
-            </a:pPr>
-            <a:r>
-              <a:rPr smtClean="0">
-                <a:latin typeface="Arial" pitchFamily="34" charset="0"/>
-                <a:cs typeface="Arial" pitchFamily="34" charset="0"/>
-              </a:rPr>
-              <a:t>Medida das perturbações nos pontos de rede.</a:t>
-            </a:r>
-          </a:p>
-          <a:p>
-            <a:pPr>
-              <a:lnSpc>
-                <a:spcPct val="150000"/>
-              </a:lnSpc>
-            </a:pPr>
-            <a:r>
-              <a:rPr smtClean="0">
-                <a:latin typeface="Arial" pitchFamily="34" charset="0"/>
-                <a:cs typeface="Arial" pitchFamily="34" charset="0"/>
-              </a:rPr>
-              <a:t>Gravação das medidas.</a:t>
-            </a:r>
-          </a:p>
-          <a:p>
-            <a:pPr>
-              <a:lnSpc>
-                <a:spcPct val="150000"/>
-              </a:lnSpc>
-              <a:buNone/>
-            </a:pPr>
-            <a:endParaRPr smtClean="0">
-              <a:latin typeface="Arial" pitchFamily="34" charset="0"/>
-              <a:cs typeface="Arial" pitchFamily="34" charset="0"/>
-            </a:endParaRPr>
-          </a:p>
-          <a:p>
-            <a:pPr>
-              <a:lnSpc>
-                <a:spcPct val="150000"/>
-              </a:lnSpc>
-            </a:pPr>
+              <a:t>o condutiva a 40cm acima do plano de terra.</a:t>
+            </a:r>
             <a:endParaRPr lang="pt-BR" dirty="0" smtClean="0">
               <a:latin typeface="Arial" pitchFamily="34" charset="0"/>
               <a:cs typeface="Arial" pitchFamily="34" charset="0"/>
@@ -3712,7 +3893,7 @@
         <p:spPr/>
         <p:txBody>
           <a:bodyPr>
-            <a:normAutofit fontScale="92500" lnSpcReduction="20000"/>
+            <a:normAutofit/>
           </a:bodyPr>
           <a:lstStyle/>
           <a:p>
@@ -3726,11 +3907,11 @@
                 <a:latin typeface="Arial" pitchFamily="34" charset="0"/>
                 <a:cs typeface="Arial" pitchFamily="34" charset="0"/>
               </a:rPr>
-              <a:t>Detectores de medições.</a:t>
-            </a:r>
-          </a:p>
-          <a:p>
-            <a:pPr>
+              <a:t>Detecção de medidas:</a:t>
+            </a:r>
+          </a:p>
+          <a:p>
+            <a:pPr lvl="1">
               <a:lnSpc>
                 <a:spcPct val="150000"/>
               </a:lnSpc>
@@ -3740,11 +3921,29 @@
                 <a:latin typeface="Arial" pitchFamily="34" charset="0"/>
                 <a:cs typeface="Arial" pitchFamily="34" charset="0"/>
               </a:rPr>
-              <a:t>Receptores de medições.</a:t>
-            </a:r>
-          </a:p>
-          <a:p>
-            <a:pPr>
+              <a:t>Deve ser realizado usando um receptor de detecção de </a:t>
+            </a:r>
+            <a:r>
+              <a:rPr smtClean="0">
+                <a:latin typeface="Arial" pitchFamily="34" charset="0"/>
+                <a:cs typeface="Arial" pitchFamily="34" charset="0"/>
+              </a:rPr>
+              <a:t>quase-pico </a:t>
+            </a:r>
+            <a:r>
+              <a:rPr smtClean="0">
+                <a:latin typeface="Arial" pitchFamily="34" charset="0"/>
+                <a:cs typeface="Arial" pitchFamily="34" charset="0"/>
+              </a:rPr>
+              <a:t>com faixa de frequência de 30MHz a 1000MHz.</a:t>
+            </a:r>
+            <a:endParaRPr smtClean="0">
+              <a:latin typeface="Arial" pitchFamily="34" charset="0"/>
+              <a:cs typeface="Arial" pitchFamily="34" charset="0"/>
+            </a:endParaRPr>
+          </a:p>
+          <a:p>
+            <a:pPr lvl="1">
               <a:lnSpc>
                 <a:spcPct val="150000"/>
               </a:lnSpc>
@@ -3754,86 +3953,23 @@
                 <a:latin typeface="Arial" pitchFamily="34" charset="0"/>
                 <a:cs typeface="Arial" pitchFamily="34" charset="0"/>
               </a:rPr>
-              <a:t>Antena.</a:t>
-            </a:r>
-          </a:p>
-          <a:p>
-            <a:pPr>
-              <a:lnSpc>
-                <a:spcPct val="150000"/>
-              </a:lnSpc>
-            </a:pPr>
+              <a:t>A largura de banda do receptor de </a:t>
+            </a:r>
             <a:r>
               <a:rPr smtClean="0">
                 <a:latin typeface="Arial" pitchFamily="34" charset="0"/>
                 <a:cs typeface="Arial" pitchFamily="34" charset="0"/>
               </a:rPr>
-              <a:t>Local de medição.</a:t>
-            </a:r>
-          </a:p>
-          <a:p>
-            <a:pPr>
-              <a:lnSpc>
-                <a:spcPct val="150000"/>
-              </a:lnSpc>
-            </a:pPr>
+              <a:t>6dB</a:t>
+            </a:r>
             <a:r>
               <a:rPr smtClean="0">
                 <a:latin typeface="Arial" pitchFamily="34" charset="0"/>
                 <a:cs typeface="Arial" pitchFamily="34" charset="0"/>
               </a:rPr>
-              <a:t>Arranjo dos equipamentos em teste.</a:t>
-            </a:r>
-          </a:p>
-          <a:p>
-            <a:pPr>
-              <a:lnSpc>
-                <a:spcPct val="150000"/>
-              </a:lnSpc>
-            </a:pPr>
-            <a:r>
-              <a:rPr smtClean="0">
-                <a:latin typeface="Arial" pitchFamily="34" charset="0"/>
-                <a:cs typeface="Arial" pitchFamily="34" charset="0"/>
-              </a:rPr>
-              <a:t>Gravação das medidas.</a:t>
-            </a:r>
-          </a:p>
-          <a:p>
-            <a:pPr>
-              <a:lnSpc>
-                <a:spcPct val="150000"/>
-              </a:lnSpc>
-            </a:pPr>
-            <a:r>
-              <a:rPr smtClean="0">
-                <a:latin typeface="Arial" pitchFamily="34" charset="0"/>
-                <a:cs typeface="Arial" pitchFamily="34" charset="0"/>
-              </a:rPr>
-              <a:t>Medições na presença de sinais de ambiente.</a:t>
-            </a:r>
-          </a:p>
-          <a:p>
-            <a:pPr>
-              <a:lnSpc>
-                <a:spcPct val="150000"/>
-              </a:lnSpc>
-            </a:pPr>
-            <a:r>
-              <a:rPr smtClean="0">
-                <a:latin typeface="Arial" pitchFamily="34" charset="0"/>
-                <a:cs typeface="Arial" pitchFamily="34" charset="0"/>
-              </a:rPr>
-              <a:t>Teste de instalação de usuário.</a:t>
-            </a:r>
-          </a:p>
-          <a:p>
-            <a:pPr>
-              <a:lnSpc>
-                <a:spcPct val="150000"/>
-              </a:lnSpc>
-            </a:pPr>
-            <a:endParaRPr lang="pt-BR" dirty="0" smtClean="0">
+              <a:t>.</a:t>
+            </a:r>
+            <a:endParaRPr smtClean="0">
               <a:latin typeface="Arial" pitchFamily="34" charset="0"/>
               <a:cs typeface="Arial" pitchFamily="34" charset="0"/>
             </a:endParaRPr>
@@ -3915,7 +4051,9 @@
         </p:nvSpPr>
         <p:spPr/>
         <p:txBody>
-          <a:bodyPr/>
+          <a:bodyPr>
+            <a:normAutofit fontScale="92500"/>
+          </a:bodyPr>
           <a:lstStyle/>
           <a:p>
             <a:pPr>
@@ -3928,23 +4066,79 @@
                 <a:latin typeface="Arial" pitchFamily="34" charset="0"/>
                 <a:cs typeface="Arial" pitchFamily="34" charset="0"/>
               </a:rPr>
-              <a:t>CISPR22:2005. </a:t>
-            </a:r>
-            <a:r>
-              <a:rPr b="1" smtClean="0">
-                <a:latin typeface="Arial" pitchFamily="34" charset="0"/>
-                <a:cs typeface="Arial" pitchFamily="34" charset="0"/>
-              </a:rPr>
-              <a:t>Information technology equipment - Radio disturbance characteristics - Limits and methods of measurement</a:t>
-            </a:r>
+              <a:t>Antena.</a:t>
+            </a:r>
+          </a:p>
+          <a:p>
+            <a:pPr lvl="1">
+              <a:lnSpc>
+                <a:spcPct val="150000"/>
+              </a:lnSpc>
+            </a:pPr>
             <a:r>
               <a:rPr smtClean="0">
                 <a:latin typeface="Arial" pitchFamily="34" charset="0"/>
                 <a:cs typeface="Arial" pitchFamily="34" charset="0"/>
               </a:rPr>
-              <a:t>.</a:t>
-            </a:r>
-            <a:endParaRPr lang="pt-BR" dirty="0" smtClean="0">
+              <a:t>Dipolo balanceada.</a:t>
+            </a:r>
+          </a:p>
+          <a:p>
+            <a:pPr lvl="1">
+              <a:lnSpc>
+                <a:spcPct val="150000"/>
+              </a:lnSpc>
+            </a:pPr>
+            <a:r>
+              <a:rPr smtClean="0">
+                <a:latin typeface="Arial" pitchFamily="34" charset="0"/>
+                <a:cs typeface="Arial" pitchFamily="34" charset="0"/>
+              </a:rPr>
+              <a:t>Frequencias de 80MHz ou acima.</a:t>
+            </a:r>
+          </a:p>
+          <a:p>
+            <a:pPr lvl="1">
+              <a:lnSpc>
+                <a:spcPct val="150000"/>
+              </a:lnSpc>
+            </a:pPr>
+            <a:r>
+              <a:rPr smtClean="0">
+                <a:latin typeface="Arial" pitchFamily="34" charset="0"/>
+                <a:cs typeface="Arial" pitchFamily="34" charset="0"/>
+              </a:rPr>
+              <a:t>Dispostas a 10m de distância do equipamento em teste.</a:t>
+            </a:r>
+          </a:p>
+          <a:p>
+            <a:pPr lvl="1">
+              <a:lnSpc>
+                <a:spcPct val="150000"/>
+              </a:lnSpc>
+            </a:pPr>
+            <a:r>
+              <a:rPr smtClean="0">
+                <a:latin typeface="Arial" pitchFamily="34" charset="0"/>
+                <a:cs typeface="Arial" pitchFamily="34" charset="0"/>
+              </a:rPr>
+              <a:t>Deve ser ajustada entre 1m a 4m acima do plano de terra.</a:t>
+            </a:r>
+          </a:p>
+          <a:p>
+            <a:pPr lvl="1">
+              <a:lnSpc>
+                <a:spcPct val="150000"/>
+              </a:lnSpc>
+            </a:pPr>
+            <a:r>
+              <a:rPr smtClean="0">
+                <a:latin typeface="Arial" pitchFamily="34" charset="0"/>
+                <a:cs typeface="Arial" pitchFamily="34" charset="0"/>
+              </a:rPr>
+              <a:t>Os testes deverão ser validados para a polarização vertical e horizontal.</a:t>
+            </a:r>
+            <a:endParaRPr smtClean="0">
               <a:latin typeface="Arial" pitchFamily="34" charset="0"/>
               <a:cs typeface="Arial" pitchFamily="34" charset="0"/>
             </a:endParaRPr>
@@ -3964,16 +4158,16 @@
         <p:spPr/>
         <p:txBody>
           <a:bodyPr>
-            <a:normAutofit/>
+            <a:normAutofit fontScale="90000"/>
           </a:bodyPr>
           <a:lstStyle/>
           <a:p>
             <a:r>
-              <a:rPr smtClean="0">
+              <a:rPr lang="pt-BR" dirty="0" smtClean="0">
                 <a:latin typeface="Arial" pitchFamily="34" charset="0"/>
                 <a:cs typeface="Arial" pitchFamily="34" charset="0"/>
               </a:rPr>
-              <a:t>REFERÊNCIAS</a:t>
+              <a:t>MÉTODO DE MEDIDA DA PERTURBAÇÃO IRRADIADA</a:t>
             </a:r>
             <a:endParaRPr lang="pt-BR" dirty="0">
               <a:latin typeface="Arial" pitchFamily="34" charset="0"/>
@@ -3998,6 +4192,117 @@
 </file>
 
 <file path=ppt/slides/slide15.xml><?xml version="1.0" encoding="utf-8"?>
+<p:sld xmlns:a="http://schemas.openxmlformats.org/drawingml/2006/main" xmlns:r="http://schemas.openxmlformats.org/officeDocument/2006/relationships" xmlns:p="http://schemas.openxmlformats.org/presentationml/2006/main">
+  <p:cSld>
+    <p:spTree>
+      <p:nvGrpSpPr>
+        <p:cNvPr id="1" name=""/>
+        <p:cNvGrpSpPr/>
+        <p:nvPr/>
+      </p:nvGrpSpPr>
+      <p:grpSpPr>
+        <a:xfrm>
+          <a:off x="0" y="0"/>
+          <a:ext cx="0" cy="0"/>
+          <a:chOff x="0" y="0"/>
+          <a:chExt cx="0" cy="0"/>
+        </a:xfrm>
+      </p:grpSpPr>
+      <p:sp>
+        <p:nvSpPr>
+          <p:cNvPr id="2" name="Espaço Reservado para Texto 1"/>
+          <p:cNvSpPr>
+            <a:spLocks noGrp="1"/>
+          </p:cNvSpPr>
+          <p:nvPr>
+            <p:ph type="body" idx="1"/>
+          </p:nvPr>
+        </p:nvSpPr>
+        <p:spPr/>
+        <p:txBody>
+          <a:bodyPr/>
+          <a:lstStyle/>
+          <a:p>
+            <a:pPr>
+              <a:lnSpc>
+                <a:spcPct val="150000"/>
+              </a:lnSpc>
+            </a:pPr>
+            <a:r>
+              <a:rPr smtClean="0">
+                <a:latin typeface="Arial" pitchFamily="34" charset="0"/>
+                <a:cs typeface="Arial" pitchFamily="34" charset="0"/>
+              </a:rPr>
+              <a:t>CISPR22:2005. </a:t>
+            </a:r>
+            <a:r>
+              <a:rPr b="1" smtClean="0">
+                <a:latin typeface="Arial" pitchFamily="34" charset="0"/>
+                <a:cs typeface="Arial" pitchFamily="34" charset="0"/>
+              </a:rPr>
+              <a:t>Information technology equipment - Radio disturbance characteristics - Limits and methods of measurement</a:t>
+            </a:r>
+            <a:r>
+              <a:rPr smtClean="0">
+                <a:latin typeface="Arial" pitchFamily="34" charset="0"/>
+                <a:cs typeface="Arial" pitchFamily="34" charset="0"/>
+              </a:rPr>
+              <a:t>.</a:t>
+            </a:r>
+            <a:endParaRPr lang="pt-BR" dirty="0" smtClean="0">
+              <a:latin typeface="Arial" pitchFamily="34" charset="0"/>
+              <a:cs typeface="Arial" pitchFamily="34" charset="0"/>
+            </a:endParaRPr>
+          </a:p>
+        </p:txBody>
+      </p:sp>
+      <p:sp>
+        <p:nvSpPr>
+          <p:cNvPr id="3" name="Título 2"/>
+          <p:cNvSpPr>
+            <a:spLocks noGrp="1"/>
+          </p:cNvSpPr>
+          <p:nvPr>
+            <p:ph type="title"/>
+          </p:nvPr>
+        </p:nvSpPr>
+        <p:spPr/>
+        <p:txBody>
+          <a:bodyPr>
+            <a:normAutofit/>
+          </a:bodyPr>
+          <a:lstStyle/>
+          <a:p>
+            <a:r>
+              <a:rPr smtClean="0">
+                <a:latin typeface="Arial" pitchFamily="34" charset="0"/>
+                <a:cs typeface="Arial" pitchFamily="34" charset="0"/>
+              </a:rPr>
+              <a:t>REFERÊNCIAS</a:t>
+            </a:r>
+            <a:endParaRPr lang="pt-BR" dirty="0">
+              <a:latin typeface="Arial" pitchFamily="34" charset="0"/>
+              <a:cs typeface="Arial" pitchFamily="34" charset="0"/>
+            </a:endParaRPr>
+          </a:p>
+        </p:txBody>
+      </p:sp>
+    </p:spTree>
+  </p:cSld>
+  <p:clrMapOvr>
+    <a:masterClrMapping/>
+  </p:clrMapOvr>
+  <p:timing>
+    <p:tnLst>
+      <p:par>
+        <p:cTn id="1" dur="indefinite" restart="never" nodeType="tmRoot"/>
+      </p:par>
+    </p:tnLst>
+  </p:timing>
+</p:sld>
+</file>
+
+<file path=ppt/slides/slide16.xml><?xml version="1.0" encoding="utf-8"?>
 <p:sld xmlns:a="http://schemas.openxmlformats.org/drawingml/2006/main" xmlns:r="http://schemas.openxmlformats.org/officeDocument/2006/relationships" xmlns:p="http://schemas.openxmlformats.org/presentationml/2006/main">
   <p:cSld>
     <p:spTree>

</xml_diff>